<commit_message>
add bilbio and php examples
</commit_message>
<xml_diff>
--- a/AIT-ansermoz-presentation-memcached.pptx
+++ b/AIT-ansermoz-presentation-memcached.pptx
@@ -87,6 +87,11 @@
       </a:defRPr>
     </a:lvl9pPr>
   </p:defaultTextStyle>
+  <p:extLst>
+    <p:ext uri="{EFAFB233-063F-42B5-8137-9DF3F51BA10A}">
+      <p15:sldGuideLst xmlns:p15="http://schemas.microsoft.com/office/powerpoint/2012/main"/>
+    </p:ext>
+  </p:extLst>
 </p:presentation>
 </file>
 
@@ -248,6 +253,125 @@
 </p:notesMaster>
 </file>
 
+<file path=ppt/notesSlides/notesSlide1.xml><?xml version="1.0" encoding="utf-8"?>
+<p:notes xmlns:a="http://schemas.openxmlformats.org/drawingml/2006/main" xmlns:r="http://schemas.openxmlformats.org/officeDocument/2006/relationships" xmlns:p="http://schemas.openxmlformats.org/presentationml/2006/main">
+  <p:cSld>
+    <p:spTree>
+      <p:nvGrpSpPr>
+        <p:cNvPr id="1" name=""/>
+        <p:cNvGrpSpPr/>
+        <p:nvPr/>
+      </p:nvGrpSpPr>
+      <p:grpSpPr>
+        <a:xfrm>
+          <a:off x="0" y="0"/>
+          <a:ext cx="0" cy="0"/>
+          <a:chOff x="0" y="0"/>
+          <a:chExt cx="0" cy="0"/>
+        </a:xfrm>
+      </p:grpSpPr>
+      <p:sp>
+        <p:nvSpPr>
+          <p:cNvPr id="2" name="Espace réservé de l'image des diapositives 1"/>
+          <p:cNvSpPr>
+            <a:spLocks noGrp="1" noRot="1" noChangeAspect="1"/>
+          </p:cNvSpPr>
+          <p:nvPr>
+            <p:ph type="sldImg"/>
+          </p:nvPr>
+        </p:nvSpPr>
+        <p:spPr/>
+      </p:sp>
+      <p:sp>
+        <p:nvSpPr>
+          <p:cNvPr id="3" name="Espace réservé des notes 2"/>
+          <p:cNvSpPr>
+            <a:spLocks noGrp="1"/>
+          </p:cNvSpPr>
+          <p:nvPr>
+            <p:ph type="body" idx="1"/>
+          </p:nvPr>
+        </p:nvSpPr>
+        <p:spPr/>
+        <p:txBody>
+          <a:bodyPr/>
+          <a:lstStyle/>
+          <a:p>
+            <a:r>
+              <a:rPr lang="fr-CH" dirty="0"/>
+              <a:t>On peut exploiter </a:t>
+            </a:r>
+            <a:r>
+              <a:rPr lang="fr-CH" dirty="0" err="1"/>
+              <a:t>memcached</a:t>
+            </a:r>
+            <a:r>
+              <a:rPr lang="fr-CH" dirty="0"/>
+              <a:t> à plusieurs niveaux, notamment des </a:t>
+            </a:r>
+            <a:r>
+              <a:rPr lang="fr-CH" dirty="0" err="1"/>
+              <a:t>UserDefinedFunctions</a:t>
+            </a:r>
+            <a:r>
+              <a:rPr lang="fr-CH" dirty="0"/>
+              <a:t> (UDF) directement avec MySQL, toutes sortes de clients peuvent interagir avec </a:t>
+            </a:r>
+            <a:r>
+              <a:rPr lang="fr-CH"/>
+              <a:t>memcached</a:t>
+            </a:r>
+            <a:endParaRPr lang="fr-CH" dirty="0"/>
+          </a:p>
+          <a:p>
+            <a:r>
+              <a:rPr lang="fr-CH" dirty="0"/>
+              <a:t>Nous focalisons ici sur l’utilisation de </a:t>
+            </a:r>
+            <a:r>
+              <a:rPr lang="fr-CH" dirty="0" err="1"/>
+              <a:t>memcached</a:t>
+            </a:r>
+            <a:r>
+              <a:rPr lang="fr-CH" dirty="0"/>
+              <a:t> avec PHP</a:t>
+            </a:r>
+          </a:p>
+          <a:p>
+            <a:r>
+              <a:rPr lang="fr-CH" dirty="0"/>
+              <a:t>Une bibliographie se trouve dans l’arborescence </a:t>
+            </a:r>
+          </a:p>
+          <a:p>
+            <a:endParaRPr lang="fr-CH" dirty="0"/>
+          </a:p>
+          <a:p>
+            <a:r>
+              <a:rPr lang="fr-CH" dirty="0"/>
+              <a:t>un plugin MySQL </a:t>
+            </a:r>
+            <a:r>
+              <a:rPr lang="fr-CH" dirty="0" err="1"/>
+              <a:t>InnoDB</a:t>
+            </a:r>
+            <a:endParaRPr lang="fr-FR" dirty="0"/>
+          </a:p>
+        </p:txBody>
+      </p:sp>
+    </p:spTree>
+    <p:extLst>
+      <p:ext uri="{BB962C8B-B14F-4D97-AF65-F5344CB8AC3E}">
+        <p14:creationId xmlns:p14="http://schemas.microsoft.com/office/powerpoint/2010/main" val="445219381"/>
+      </p:ext>
+    </p:extLst>
+  </p:cSld>
+  <p:clrMapOvr>
+    <a:masterClrMapping/>
+  </p:clrMapOvr>
+</p:notes>
+</file>
+
 <file path=ppt/slideLayouts/slideLayout1.xml><?xml version="1.0" encoding="utf-8"?>
 <p:sldLayout xmlns:a="http://schemas.openxmlformats.org/drawingml/2006/main" xmlns:r="http://schemas.openxmlformats.org/officeDocument/2006/relationships" xmlns:p="http://schemas.openxmlformats.org/presentationml/2006/main" showMasterSp="0" type="tx">
   <p:cSld name="Title &amp; Subtitle">
@@ -321,7 +445,7 @@
           </a:ln>
           <a:extLst>
             <a:ext uri="{C572A759-6A51-4108-AA02-DFA0A04FC94B}">
-              <ma14:wrappingTextBoxFlag xmlns:ma14="http://schemas.microsoft.com/office/mac/drawingml/2011/main" xmlns="" val="1"/>
+              <ma14:wrappingTextBoxFlag xmlns="" xmlns:ma14="http://schemas.microsoft.com/office/mac/drawingml/2011/main" val="1"/>
             </a:ext>
           </a:extLst>
         </p:spPr>
@@ -377,7 +501,7 @@
           </a:ln>
           <a:extLst>
             <a:ext uri="{C572A759-6A51-4108-AA02-DFA0A04FC94B}">
-              <ma14:wrappingTextBoxFlag xmlns:ma14="http://schemas.microsoft.com/office/mac/drawingml/2011/main" xmlns="" val="1"/>
+              <ma14:wrappingTextBoxFlag xmlns="" xmlns:ma14="http://schemas.microsoft.com/office/mac/drawingml/2011/main" val="1"/>
             </a:ext>
           </a:extLst>
         </p:spPr>
@@ -1595,7 +1719,7 @@
           </a:ln>
           <a:extLst>
             <a:ext uri="{C572A759-6A51-4108-AA02-DFA0A04FC94B}">
-              <ma14:wrappingTextBoxFlag xmlns:ma14="http://schemas.microsoft.com/office/mac/drawingml/2011/main" xmlns="" val="1"/>
+              <ma14:wrappingTextBoxFlag xmlns="" xmlns:ma14="http://schemas.microsoft.com/office/mac/drawingml/2011/main" val="1"/>
             </a:ext>
           </a:extLst>
         </p:spPr>
@@ -1646,7 +1770,7 @@
           </a:ln>
           <a:extLst>
             <a:ext uri="{C572A759-6A51-4108-AA02-DFA0A04FC94B}">
-              <ma14:wrappingTextBoxFlag xmlns:ma14="http://schemas.microsoft.com/office/mac/drawingml/2011/main" xmlns="" val="1"/>
+              <ma14:wrappingTextBoxFlag xmlns="" xmlns:ma14="http://schemas.microsoft.com/office/mac/drawingml/2011/main" val="1"/>
             </a:ext>
           </a:extLst>
         </p:spPr>
@@ -1722,7 +1846,7 @@
           </a:ln>
           <a:extLst>
             <a:ext uri="{C572A759-6A51-4108-AA02-DFA0A04FC94B}">
-              <ma14:wrappingTextBoxFlag xmlns:ma14="http://schemas.microsoft.com/office/mac/drawingml/2011/main" xmlns="" val="1"/>
+              <ma14:wrappingTextBoxFlag xmlns="" xmlns:ma14="http://schemas.microsoft.com/office/mac/drawingml/2011/main" val="1"/>
             </a:ext>
           </a:extLst>
         </p:spPr>
@@ -1782,7 +1906,7 @@
           </a:ln>
           <a:extLst>
             <a:ext uri="{C572A759-6A51-4108-AA02-DFA0A04FC94B}">
-              <ma14:wrappingTextBoxFlag xmlns:ma14="http://schemas.microsoft.com/office/mac/drawingml/2011/main" xmlns="" val="1"/>
+              <ma14:wrappingTextBoxFlag xmlns="" xmlns:ma14="http://schemas.microsoft.com/office/mac/drawingml/2011/main" val="1"/>
             </a:ext>
           </a:extLst>
         </p:spPr>
@@ -1831,7 +1955,7 @@
           </a:ln>
           <a:extLst>
             <a:ext uri="{C572A759-6A51-4108-AA02-DFA0A04FC94B}">
-              <ma14:wrappingTextBoxFlag xmlns:ma14="http://schemas.microsoft.com/office/mac/drawingml/2011/main" xmlns="" val="1"/>
+              <ma14:wrappingTextBoxFlag xmlns="" xmlns:ma14="http://schemas.microsoft.com/office/mac/drawingml/2011/main" val="1"/>
             </a:ext>
           </a:extLst>
         </p:spPr>
@@ -2507,7 +2631,7 @@
           </a:prstGeom>
           <a:extLst>
             <a:ext uri="{C572A759-6A51-4108-AA02-DFA0A04FC94B}">
-              <ma14:wrappingTextBoxFlag xmlns:ma14="http://schemas.microsoft.com/office/mac/drawingml/2011/main" xmlns="" val="1"/>
+              <ma14:wrappingTextBoxFlag xmlns="" xmlns:ma14="http://schemas.microsoft.com/office/mac/drawingml/2011/main" val="1"/>
             </a:ext>
           </a:extLst>
         </p:spPr>

</xml_diff>